<commit_message>
added test statistic content
</commit_message>
<xml_diff>
--- a/slides/COP2073C-Module8.pptx
+++ b/slides/COP2073C-Module8.pptx
@@ -258,7 +258,7 @@
           <a:p>
             <a:fld id="{2A37B5DA-8E33-465E-AA6E-3D89F39FC24F}" type="datetimeFigureOut">
               <a:rPr lang="en-US" smtClean="0"/>
-              <a:t>12/25/2022</a:t>
+              <a:t>12/26/2022</a:t>
             </a:fld>
             <a:endParaRPr lang="en-US" dirty="0"/>
           </a:p>
@@ -1199,7 +1199,7 @@
           <a:p>
             <a:fld id="{EA4713E7-B5C7-46C0-9D1A-09BA4EBDD267}" type="datetime1">
               <a:rPr lang="en-US" smtClean="0"/>
-              <a:t>12/25/2022</a:t>
+              <a:t>12/26/2022</a:t>
             </a:fld>
             <a:endParaRPr lang="en-US"/>
           </a:p>
@@ -5771,10 +5771,16 @@
           <a:p>
             <a:pPr marR="0" rtl="0"/>
             <a:r>
+              <a:rPr lang="en-US" b="0" i="0" u="none" strike="noStrike" baseline="0">
+                <a:latin typeface="Cambria" panose="02040503050406030204" pitchFamily="18" charset="0"/>
+              </a:rPr>
+              <a:t>The Test </a:t>
+            </a:r>
+            <a:r>
               <a:rPr lang="en-US" b="0" i="0" u="none" strike="noStrike" baseline="0" dirty="0">
                 <a:latin typeface="Cambria" panose="02040503050406030204" pitchFamily="18" charset="0"/>
               </a:rPr>
-              <a:t>Test Statistic</a:t>
+              <a:t>Statistic</a:t>
             </a:r>
           </a:p>
         </p:txBody>
@@ -6086,9 +6092,10 @@
           <a:lstStyle/>
           <a:p>
             <a:r>
-              <a:rPr lang="en-US" dirty="0"/>
-              <a:t>Lower-Tailed Test</a:t>
-            </a:r>
+              <a:rPr lang="en-US"/>
+              <a:t>Lower-Tailed Tests</a:t>
+            </a:r>
+            <a:endParaRPr lang="en-US" dirty="0"/>
           </a:p>
         </p:txBody>
       </p:sp>
@@ -6344,9 +6351,10 @@
           <a:lstStyle/>
           <a:p>
             <a:r>
-              <a:rPr lang="en-US" dirty="0"/>
-              <a:t>Upper-Tailed Test</a:t>
-            </a:r>
+              <a:rPr lang="en-US"/>
+              <a:t>Upper-Tailed Tests</a:t>
+            </a:r>
+            <a:endParaRPr lang="en-US" dirty="0"/>
           </a:p>
         </p:txBody>
       </p:sp>
@@ -6534,9 +6542,10 @@
           <a:lstStyle/>
           <a:p>
             <a:r>
-              <a:rPr lang="en-US" dirty="0"/>
-              <a:t>Two-Tailed Test</a:t>
-            </a:r>
+              <a:rPr lang="en-US"/>
+              <a:t>Two-Tailed Tests</a:t>
+            </a:r>
+            <a:endParaRPr lang="en-US" dirty="0"/>
           </a:p>
         </p:txBody>
       </p:sp>

</xml_diff>

<commit_message>
finished analysis of variance
</commit_message>
<xml_diff>
--- a/slides/COP2073C-Module8.pptx
+++ b/slides/COP2073C-Module8.pptx
@@ -259,7 +259,7 @@
           <a:p>
             <a:fld id="{2A37B5DA-8E33-465E-AA6E-3D89F39FC24F}" type="datetimeFigureOut">
               <a:rPr lang="en-US" smtClean="0"/>
-              <a:t>12/27/2022</a:t>
+              <a:t>12/28/2022</a:t>
             </a:fld>
             <a:endParaRPr lang="en-US" dirty="0"/>
           </a:p>
@@ -1200,7 +1200,7 @@
           <a:p>
             <a:fld id="{EA4713E7-B5C7-46C0-9D1A-09BA4EBDD267}" type="datetime1">
               <a:rPr lang="en-US" smtClean="0"/>
-              <a:t>12/27/2022</a:t>
+              <a:t>12/28/2022</a:t>
             </a:fld>
             <a:endParaRPr lang="en-US"/>
           </a:p>
@@ -13177,9 +13177,10 @@
           <a:lstStyle/>
           <a:p>
             <a:r>
-              <a:rPr lang="en-US" dirty="0"/>
-              <a:t>What is ANOVA</a:t>
-            </a:r>
+              <a:rPr lang="en-US"/>
+              <a:t>ANOVA</a:t>
+            </a:r>
+            <a:endParaRPr lang="en-US" dirty="0"/>
           </a:p>
         </p:txBody>
       </p:sp>
@@ -13235,7 +13236,15 @@
             <a:pPr lvl="1"/>
             <a:r>
               <a:rPr lang="en-US" sz="2400" dirty="0"/>
-              <a:t>null hypothesis: the mean is the same for all groups</a:t>
+              <a:t>N</a:t>
+            </a:r>
+            <a:r>
+              <a:rPr lang="en-US" sz="2400"/>
+              <a:t>ull </a:t>
+            </a:r>
+            <a:r>
+              <a:rPr lang="en-US" sz="2400" dirty="0"/>
+              <a:t>hypothesis: the mean is the same for all groups</a:t>
             </a:r>
           </a:p>
           <a:p>
@@ -13676,7 +13685,35 @@
                 <a:latin typeface="Courier New" panose="02070309020205020404" pitchFamily="49" charset="0"/>
                 <a:cs typeface="Courier New" panose="02070309020205020404" pitchFamily="49" charset="0"/>
               </a:rPr>
-              <a:t>The levels of group are ‘ctrl’, ‘trt1’, and ‘trt2’</a:t>
+              <a:t>The levels of group </a:t>
+            </a:r>
+            <a:r>
+              <a:rPr lang="en-US" sz="1800">
+                <a:latin typeface="Courier New" panose="02070309020205020404" pitchFamily="49" charset="0"/>
+                <a:cs typeface="Courier New" panose="02070309020205020404" pitchFamily="49" charset="0"/>
+              </a:rPr>
+              <a:t>are 'ctrl', 'trt1</a:t>
+            </a:r>
+            <a:r>
+              <a:rPr lang="en-US" sz="1800" dirty="0">
+                <a:latin typeface="Courier New" panose="02070309020205020404" pitchFamily="49" charset="0"/>
+                <a:cs typeface="Courier New" panose="02070309020205020404" pitchFamily="49" charset="0"/>
+              </a:rPr>
+              <a:t>'</a:t>
+            </a:r>
+            <a:r>
+              <a:rPr lang="en-US" sz="1800">
+                <a:latin typeface="Courier New" panose="02070309020205020404" pitchFamily="49" charset="0"/>
+                <a:cs typeface="Courier New" panose="02070309020205020404" pitchFamily="49" charset="0"/>
+              </a:rPr>
+              <a:t>, and 'trt2</a:t>
+            </a:r>
+            <a:r>
+              <a:rPr lang="en-US" sz="1800" dirty="0">
+                <a:latin typeface="Courier New" panose="02070309020205020404" pitchFamily="49" charset="0"/>
+                <a:cs typeface="Courier New" panose="02070309020205020404" pitchFamily="49" charset="0"/>
+              </a:rPr>
+              <a:t>'</a:t>
             </a:r>
           </a:p>
         </p:txBody>
@@ -14248,8 +14285,17 @@
               <a:rPr lang="en-US" sz="2800" dirty="0">
                 <a:cs typeface="Courier New" panose="02070309020205020404" pitchFamily="49" charset="0"/>
               </a:rPr>
-              <a:t>Plot the data; what do you think?</a:t>
-            </a:r>
+              <a:t>Plot the data; what do you </a:t>
+            </a:r>
+            <a:r>
+              <a:rPr lang="en-US" sz="2800">
+                <a:cs typeface="Courier New" panose="02070309020205020404" pitchFamily="49" charset="0"/>
+              </a:rPr>
+              <a:t>think? Does Treatment 1 or Treatment 2 have a statistically relevant effect on the weight of the plants?</a:t>
+            </a:r>
+            <a:endParaRPr lang="en-US" sz="2800" dirty="0">
+              <a:cs typeface="Courier New" panose="02070309020205020404" pitchFamily="49" charset="0"/>
+            </a:endParaRPr>
           </a:p>
         </p:txBody>
       </p:sp>
@@ -14296,8 +14342,8 @@
         </p:nvSpPr>
         <p:spPr>
           <a:xfrm>
-            <a:off x="1056640" y="1826542"/>
-            <a:ext cx="8617712" cy="4339650"/>
+            <a:off x="1281611" y="2196657"/>
+            <a:ext cx="8617712" cy="4093428"/>
           </a:xfrm>
           <a:prstGeom prst="rect">
             <a:avLst/>
@@ -14335,12 +14381,6 @@
               </a:rPr>
               <a:t>)</a:t>
             </a:r>
-          </a:p>
-          <a:p>
-            <a:endParaRPr lang="en-US" sz="1600" dirty="0">
-              <a:latin typeface="Courier New" panose="02070309020205020404" pitchFamily="49" charset="0"/>
-              <a:cs typeface="Courier New" panose="02070309020205020404" pitchFamily="49" charset="0"/>
-            </a:endParaRPr>
           </a:p>
           <a:p>
             <a:endParaRPr lang="en-US" sz="1600" dirty="0">
@@ -14455,7 +14495,7 @@
         </p:blipFill>
         <p:spPr>
           <a:xfrm>
-            <a:off x="2166747" y="2542032"/>
+            <a:off x="2623947" y="2828110"/>
             <a:ext cx="6267450" cy="3338082"/>
           </a:xfrm>
           <a:prstGeom prst="rect">
@@ -14548,100 +14588,56 @@
         <p:spPr>
           <a:xfrm>
             <a:off x="707935" y="1089423"/>
-            <a:ext cx="10160000" cy="1242511"/>
+            <a:ext cx="10160000" cy="1864234"/>
           </a:xfrm>
         </p:spPr>
         <p:txBody>
           <a:bodyPr>
-            <a:normAutofit fontScale="25000" lnSpcReduction="20000"/>
+            <a:normAutofit/>
           </a:bodyPr>
           <a:lstStyle/>
           <a:p>
             <a:r>
-              <a:rPr lang="en-US" sz="2400" dirty="0">
+              <a:rPr lang="en-US" sz="2000" dirty="0">
                 <a:cs typeface="Courier New" panose="02070309020205020404" pitchFamily="49" charset="0"/>
               </a:rPr>
               <a:t>We want to know if there is a significant statistical difference between the average weights of the plants in the 3 experimental conditions</a:t>
             </a:r>
           </a:p>
           <a:p>
-            <a:pPr lvl="1"/>
-            <a:r>
-              <a:rPr lang="en-US" sz="2200" dirty="0">
-                <a:cs typeface="Courier New" panose="02070309020205020404" pitchFamily="49" charset="0"/>
-              </a:rPr>
-              <a:t>Plot the data; what do you think?</a:t>
-            </a:r>
-          </a:p>
-          <a:p>
-            <a:endParaRPr lang="en-US" sz="2400" dirty="0">
+            <a:r>
+              <a:rPr lang="en-US" sz="2000">
+                <a:cs typeface="Courier New" panose="02070309020205020404" pitchFamily="49" charset="0"/>
+              </a:rPr>
+              <a:t>Before </a:t>
+            </a:r>
+            <a:r>
+              <a:rPr lang="en-US" sz="2000" dirty="0">
+                <a:cs typeface="Courier New" panose="02070309020205020404" pitchFamily="49" charset="0"/>
+              </a:rPr>
+              <a:t>doing the analysis we need to take a detour and look at </a:t>
+            </a:r>
+            <a:r>
+              <a:rPr lang="en-US" sz="2000" u="sng" dirty="0">
+                <a:cs typeface="Courier New" panose="02070309020205020404" pitchFamily="49" charset="0"/>
+              </a:rPr>
+              <a:t>formula notation </a:t>
+            </a:r>
+            <a:r>
+              <a:rPr lang="en-US" sz="2000" dirty="0">
+                <a:cs typeface="Courier New" panose="02070309020205020404" pitchFamily="49" charset="0"/>
+              </a:rPr>
+              <a:t>so we understand how it is used in the steps we </a:t>
+            </a:r>
+            <a:r>
+              <a:rPr lang="en-US" sz="2000">
+                <a:cs typeface="Courier New" panose="02070309020205020404" pitchFamily="49" charset="0"/>
+              </a:rPr>
+              <a:t>will take</a:t>
+            </a:r>
+            <a:endParaRPr lang="en-US" sz="2000" dirty="0">
               <a:cs typeface="Courier New" panose="02070309020205020404" pitchFamily="49" charset="0"/>
             </a:endParaRPr>
-          </a:p>
-          <a:p>
-            <a:endParaRPr lang="en-US" sz="2400" dirty="0">
-              <a:cs typeface="Courier New" panose="02070309020205020404" pitchFamily="49" charset="0"/>
-            </a:endParaRPr>
-          </a:p>
-          <a:p>
-            <a:pPr marL="114300" indent="0">
-              <a:buNone/>
-            </a:pPr>
-            <a:endParaRPr lang="en-US" sz="2800" dirty="0">
-              <a:cs typeface="Courier New" panose="02070309020205020404" pitchFamily="49" charset="0"/>
-            </a:endParaRPr>
-          </a:p>
-          <a:p>
-            <a:pPr marL="114300" indent="0">
-              <a:buNone/>
-            </a:pPr>
-            <a:endParaRPr lang="en-US" sz="2800" dirty="0">
-              <a:cs typeface="Courier New" panose="02070309020205020404" pitchFamily="49" charset="0"/>
-            </a:endParaRPr>
-          </a:p>
-          <a:p>
-            <a:pPr marL="114300" indent="0">
-              <a:buNone/>
-            </a:pPr>
-            <a:endParaRPr lang="en-US" sz="2800" dirty="0">
-              <a:cs typeface="Courier New" panose="02070309020205020404" pitchFamily="49" charset="0"/>
-            </a:endParaRPr>
-          </a:p>
-          <a:p>
-            <a:pPr marL="114300" indent="0">
-              <a:buNone/>
-            </a:pPr>
-            <a:endParaRPr lang="en-US" sz="2800" dirty="0">
-              <a:cs typeface="Courier New" panose="02070309020205020404" pitchFamily="49" charset="0"/>
-            </a:endParaRPr>
-          </a:p>
-          <a:p>
-            <a:pPr marL="114300" indent="0">
-              <a:buNone/>
-            </a:pPr>
-            <a:endParaRPr lang="en-US" sz="2800" dirty="0">
-              <a:cs typeface="Courier New" panose="02070309020205020404" pitchFamily="49" charset="0"/>
-            </a:endParaRPr>
-          </a:p>
-          <a:p>
-            <a:r>
-              <a:rPr lang="en-US" sz="2400" dirty="0">
-                <a:cs typeface="Courier New" panose="02070309020205020404" pitchFamily="49" charset="0"/>
-              </a:rPr>
-              <a:t>Before doing the analysis we need to take a detour and look at </a:t>
-            </a:r>
-            <a:r>
-              <a:rPr lang="en-US" sz="2400" u="sng" dirty="0">
-                <a:cs typeface="Courier New" panose="02070309020205020404" pitchFamily="49" charset="0"/>
-              </a:rPr>
-              <a:t>formula notation </a:t>
-            </a:r>
-            <a:r>
-              <a:rPr lang="en-US" sz="2400" dirty="0">
-                <a:cs typeface="Courier New" panose="02070309020205020404" pitchFamily="49" charset="0"/>
-              </a:rPr>
-              <a:t>so we understand how it is used in the steps we will take</a:t>
-            </a:r>
           </a:p>
         </p:txBody>
       </p:sp>
@@ -14688,7 +14684,7 @@
         </p:nvSpPr>
         <p:spPr>
           <a:xfrm>
-            <a:off x="1369785" y="2487168"/>
+            <a:off x="1195613" y="3176597"/>
             <a:ext cx="8617712" cy="3077766"/>
           </a:xfrm>
           <a:prstGeom prst="rect">
@@ -14711,7 +14707,21 @@
                 <a:latin typeface="Courier New" panose="02070309020205020404" pitchFamily="49" charset="0"/>
                 <a:cs typeface="Courier New" panose="02070309020205020404" pitchFamily="49" charset="0"/>
               </a:rPr>
-              <a:t>&gt; boxplot(weight ~ group, data = </a:t>
+              <a:t>&gt; boxplot(</a:t>
+            </a:r>
+            <a:r>
+              <a:rPr lang="en-US" b="1" dirty="0">
+                <a:latin typeface="Courier New" panose="02070309020205020404" pitchFamily="49" charset="0"/>
+                <a:cs typeface="Courier New" panose="02070309020205020404" pitchFamily="49" charset="0"/>
+              </a:rPr>
+              <a:t>weight ~ group</a:t>
+            </a:r>
+            <a:r>
+              <a:rPr lang="en-US" dirty="0">
+                <a:latin typeface="Courier New" panose="02070309020205020404" pitchFamily="49" charset="0"/>
+                <a:cs typeface="Courier New" panose="02070309020205020404" pitchFamily="49" charset="0"/>
+              </a:rPr>
+              <a:t>, data = </a:t>
             </a:r>
             <a:r>
               <a:rPr lang="en-US" dirty="0" err="1">
@@ -14817,7 +14827,7 @@
         </p:blipFill>
         <p:spPr>
           <a:xfrm>
-            <a:off x="3888419" y="2940820"/>
+            <a:off x="2901447" y="3688305"/>
             <a:ext cx="4635472" cy="2468880"/>
           </a:xfrm>
           <a:prstGeom prst="rect">
@@ -16346,8 +16356,13 @@
             </a:r>
             <a:r>
               <a:rPr lang="en-US" sz="2400" dirty="0"/>
-              <a:t>() function can be passed to the summary function to give us the desired results</a:t>
-            </a:r>
+              <a:t>() function can be passed to the summary function to give us the </a:t>
+            </a:r>
+            <a:r>
+              <a:rPr lang="en-US" sz="2400"/>
+              <a:t>desired results (note the F value and p-value)</a:t>
+            </a:r>
+            <a:endParaRPr lang="en-US" sz="2400" dirty="0"/>
           </a:p>
         </p:txBody>
       </p:sp>

</xml_diff>